<commit_message>
working on this week's slides
</commit_message>
<xml_diff>
--- a/slides/pptx/week01.pptx
+++ b/slides/pptx/week01.pptx
@@ -280,7 +280,7 @@
           <a:p>
             <a:fld id="{241EB5C9-1307-BA42-ABA2-0BC069CD8E7F}" type="datetimeFigureOut">
               <a:rPr lang="en-US" smtClean="0"/>
-              <a:t>1/19/2019</a:t>
+              <a:t>2/19/2019</a:t>
             </a:fld>
             <a:endParaRPr lang="en-US"/>
           </a:p>
@@ -478,7 +478,7 @@
           <a:p>
             <a:fld id="{241EB5C9-1307-BA42-ABA2-0BC069CD8E7F}" type="datetimeFigureOut">
               <a:rPr lang="en-US" smtClean="0"/>
-              <a:t>1/19/2019</a:t>
+              <a:t>2/19/2019</a:t>
             </a:fld>
             <a:endParaRPr lang="en-US"/>
           </a:p>
@@ -686,7 +686,7 @@
           <a:p>
             <a:fld id="{241EB5C9-1307-BA42-ABA2-0BC069CD8E7F}" type="datetimeFigureOut">
               <a:rPr lang="en-US" smtClean="0"/>
-              <a:t>1/19/2019</a:t>
+              <a:t>2/19/2019</a:t>
             </a:fld>
             <a:endParaRPr lang="en-US"/>
           </a:p>
@@ -884,7 +884,7 @@
           <a:p>
             <a:fld id="{241EB5C9-1307-BA42-ABA2-0BC069CD8E7F}" type="datetimeFigureOut">
               <a:rPr lang="en-US" smtClean="0"/>
-              <a:t>1/19/2019</a:t>
+              <a:t>2/19/2019</a:t>
             </a:fld>
             <a:endParaRPr lang="en-US"/>
           </a:p>
@@ -1161,7 +1161,7 @@
           <a:p>
             <a:fld id="{241EB5C9-1307-BA42-ABA2-0BC069CD8E7F}" type="datetimeFigureOut">
               <a:rPr lang="en-US" smtClean="0"/>
-              <a:t>1/19/2019</a:t>
+              <a:t>2/19/2019</a:t>
             </a:fld>
             <a:endParaRPr lang="en-US"/>
           </a:p>
@@ -1426,7 +1426,7 @@
           <a:p>
             <a:fld id="{241EB5C9-1307-BA42-ABA2-0BC069CD8E7F}" type="datetimeFigureOut">
               <a:rPr lang="en-US" smtClean="0"/>
-              <a:t>1/19/2019</a:t>
+              <a:t>2/19/2019</a:t>
             </a:fld>
             <a:endParaRPr lang="en-US"/>
           </a:p>
@@ -1838,7 +1838,7 @@
           <a:p>
             <a:fld id="{241EB5C9-1307-BA42-ABA2-0BC069CD8E7F}" type="datetimeFigureOut">
               <a:rPr lang="en-US" smtClean="0"/>
-              <a:t>1/19/2019</a:t>
+              <a:t>2/19/2019</a:t>
             </a:fld>
             <a:endParaRPr lang="en-US"/>
           </a:p>
@@ -1979,7 +1979,7 @@
           <a:p>
             <a:fld id="{241EB5C9-1307-BA42-ABA2-0BC069CD8E7F}" type="datetimeFigureOut">
               <a:rPr lang="en-US" smtClean="0"/>
-              <a:t>1/19/2019</a:t>
+              <a:t>2/19/2019</a:t>
             </a:fld>
             <a:endParaRPr lang="en-US"/>
           </a:p>
@@ -2092,7 +2092,7 @@
           <a:p>
             <a:fld id="{241EB5C9-1307-BA42-ABA2-0BC069CD8E7F}" type="datetimeFigureOut">
               <a:rPr lang="en-US" smtClean="0"/>
-              <a:t>1/19/2019</a:t>
+              <a:t>2/19/2019</a:t>
             </a:fld>
             <a:endParaRPr lang="en-US"/>
           </a:p>
@@ -2403,7 +2403,7 @@
           <a:p>
             <a:fld id="{241EB5C9-1307-BA42-ABA2-0BC069CD8E7F}" type="datetimeFigureOut">
               <a:rPr lang="en-US" smtClean="0"/>
-              <a:t>1/19/2019</a:t>
+              <a:t>2/19/2019</a:t>
             </a:fld>
             <a:endParaRPr lang="en-US"/>
           </a:p>
@@ -2691,7 +2691,7 @@
           <a:p>
             <a:fld id="{241EB5C9-1307-BA42-ABA2-0BC069CD8E7F}" type="datetimeFigureOut">
               <a:rPr lang="en-US" smtClean="0"/>
-              <a:t>1/19/2019</a:t>
+              <a:t>2/19/2019</a:t>
             </a:fld>
             <a:endParaRPr lang="en-US"/>
           </a:p>
@@ -2857,35 +2857,35 @@
           <a:p>
             <a:pPr lvl="0"/>
             <a:r>
-              <a:rPr lang="en-US"/>
+              <a:rPr lang="en-US" dirty="0"/>
               <a:t>Edit Master text styles</a:t>
             </a:r>
           </a:p>
           <a:p>
             <a:pPr lvl="1"/>
             <a:r>
-              <a:rPr lang="en-US"/>
+              <a:rPr lang="en-US" dirty="0"/>
               <a:t>Second level</a:t>
             </a:r>
           </a:p>
           <a:p>
             <a:pPr lvl="2"/>
             <a:r>
-              <a:rPr lang="en-US"/>
+              <a:rPr lang="en-US" dirty="0"/>
               <a:t>Third level</a:t>
             </a:r>
           </a:p>
           <a:p>
             <a:pPr lvl="3"/>
             <a:r>
-              <a:rPr lang="en-US"/>
+              <a:rPr lang="en-US" dirty="0"/>
               <a:t>Fourth level</a:t>
             </a:r>
           </a:p>
           <a:p>
             <a:pPr lvl="4"/>
             <a:r>
-              <a:rPr lang="en-US"/>
+              <a:rPr lang="en-US" dirty="0"/>
               <a:t>Fifth level</a:t>
             </a:r>
           </a:p>
@@ -2932,7 +2932,7 @@
           <a:p>
             <a:fld id="{241EB5C9-1307-BA42-ABA2-0BC069CD8E7F}" type="datetimeFigureOut">
               <a:rPr lang="en-US" smtClean="0"/>
-              <a:t>1/19/2019</a:t>
+              <a:t>2/19/2019</a:t>
             </a:fld>
             <a:endParaRPr lang="en-US"/>
           </a:p>
@@ -3089,7 +3089,7 @@
           <a:spcPct val="0"/>
         </a:spcBef>
         <a:buNone/>
-        <a:defRPr sz="5600" b="1" kern="1200">
+        <a:defRPr sz="4400" b="1" kern="1200">
           <a:solidFill>
             <a:schemeClr val="tx1"/>
           </a:solidFill>

</xml_diff>